<commit_message>
feat: Add Proxy class for SparseMatrix to handle element assignment and retrieval
</commit_message>
<xml_diff>
--- a/DataStructures/Project/Presentation.pptx
+++ b/DataStructures/Project/Presentation.pptx
@@ -7,6 +7,9 @@
   <p:sldIdLst>
     <p:sldId id="256" r:id="rId2"/>
     <p:sldId id="258" r:id="rId3"/>
+    <p:sldId id="260" r:id="rId4"/>
+    <p:sldId id="261" r:id="rId5"/>
+    <p:sldId id="259" r:id="rId6"/>
   </p:sldIdLst>
   <p:sldSz cx="12192000" cy="6858000"/>
   <p:notesSz cx="6858000" cy="9144000"/>
@@ -270,7 +273,7 @@
           <a:p>
             <a:fld id="{979E2517-0A45-47AC-AE12-896543034F76}" type="datetimeFigureOut">
               <a:rPr lang="nl-BE" smtClean="0"/>
-              <a:t>19/11/2025</a:t>
+              <a:t>20/11/2025</a:t>
             </a:fld>
             <a:endParaRPr lang="nl-BE"/>
           </a:p>
@@ -470,7 +473,7 @@
           <a:p>
             <a:fld id="{979E2517-0A45-47AC-AE12-896543034F76}" type="datetimeFigureOut">
               <a:rPr lang="nl-BE" smtClean="0"/>
-              <a:t>19/11/2025</a:t>
+              <a:t>20/11/2025</a:t>
             </a:fld>
             <a:endParaRPr lang="nl-BE"/>
           </a:p>
@@ -680,7 +683,7 @@
           <a:p>
             <a:fld id="{979E2517-0A45-47AC-AE12-896543034F76}" type="datetimeFigureOut">
               <a:rPr lang="nl-BE" smtClean="0"/>
-              <a:t>19/11/2025</a:t>
+              <a:t>20/11/2025</a:t>
             </a:fld>
             <a:endParaRPr lang="nl-BE"/>
           </a:p>
@@ -880,7 +883,7 @@
           <a:p>
             <a:fld id="{979E2517-0A45-47AC-AE12-896543034F76}" type="datetimeFigureOut">
               <a:rPr lang="nl-BE" smtClean="0"/>
-              <a:t>19/11/2025</a:t>
+              <a:t>20/11/2025</a:t>
             </a:fld>
             <a:endParaRPr lang="nl-BE"/>
           </a:p>
@@ -1156,7 +1159,7 @@
           <a:p>
             <a:fld id="{979E2517-0A45-47AC-AE12-896543034F76}" type="datetimeFigureOut">
               <a:rPr lang="nl-BE" smtClean="0"/>
-              <a:t>19/11/2025</a:t>
+              <a:t>20/11/2025</a:t>
             </a:fld>
             <a:endParaRPr lang="nl-BE"/>
           </a:p>
@@ -1424,7 +1427,7 @@
           <a:p>
             <a:fld id="{979E2517-0A45-47AC-AE12-896543034F76}" type="datetimeFigureOut">
               <a:rPr lang="nl-BE" smtClean="0"/>
-              <a:t>19/11/2025</a:t>
+              <a:t>20/11/2025</a:t>
             </a:fld>
             <a:endParaRPr lang="nl-BE"/>
           </a:p>
@@ -1839,7 +1842,7 @@
           <a:p>
             <a:fld id="{979E2517-0A45-47AC-AE12-896543034F76}" type="datetimeFigureOut">
               <a:rPr lang="nl-BE" smtClean="0"/>
-              <a:t>19/11/2025</a:t>
+              <a:t>20/11/2025</a:t>
             </a:fld>
             <a:endParaRPr lang="nl-BE"/>
           </a:p>
@@ -1981,7 +1984,7 @@
           <a:p>
             <a:fld id="{979E2517-0A45-47AC-AE12-896543034F76}" type="datetimeFigureOut">
               <a:rPr lang="nl-BE" smtClean="0"/>
-              <a:t>19/11/2025</a:t>
+              <a:t>20/11/2025</a:t>
             </a:fld>
             <a:endParaRPr lang="nl-BE"/>
           </a:p>
@@ -2094,7 +2097,7 @@
           <a:p>
             <a:fld id="{979E2517-0A45-47AC-AE12-896543034F76}" type="datetimeFigureOut">
               <a:rPr lang="nl-BE" smtClean="0"/>
-              <a:t>19/11/2025</a:t>
+              <a:t>20/11/2025</a:t>
             </a:fld>
             <a:endParaRPr lang="nl-BE"/>
           </a:p>
@@ -2407,7 +2410,7 @@
           <a:p>
             <a:fld id="{979E2517-0A45-47AC-AE12-896543034F76}" type="datetimeFigureOut">
               <a:rPr lang="nl-BE" smtClean="0"/>
-              <a:t>19/11/2025</a:t>
+              <a:t>20/11/2025</a:t>
             </a:fld>
             <a:endParaRPr lang="nl-BE"/>
           </a:p>
@@ -2700,7 +2703,7 @@
           <a:p>
             <a:fld id="{979E2517-0A45-47AC-AE12-896543034F76}" type="datetimeFigureOut">
               <a:rPr lang="nl-BE" smtClean="0"/>
-              <a:t>19/11/2025</a:t>
+              <a:t>20/11/2025</a:t>
             </a:fld>
             <a:endParaRPr lang="nl-BE"/>
           </a:p>
@@ -2943,7 +2946,7 @@
           <a:p>
             <a:fld id="{979E2517-0A45-47AC-AE12-896543034F76}" type="datetimeFigureOut">
               <a:rPr lang="nl-BE" smtClean="0"/>
-              <a:t>19/11/2025</a:t>
+              <a:t>20/11/2025</a:t>
             </a:fld>
             <a:endParaRPr lang="nl-BE"/>
           </a:p>
@@ -3962,7 +3965,7 @@
                 <a:latin typeface="Arial" panose="020B0604020202020204" pitchFamily="34" charset="0"/>
                 <a:cs typeface="Arial" panose="020B0604020202020204" pitchFamily="34" charset="0"/>
               </a:rPr>
-              <a:t>/20</a:t>
+              <a:t>/03</a:t>
             </a:r>
             <a:endParaRPr lang="nl-BE" dirty="0"/>
           </a:p>
@@ -3982,8 +3985,8 @@
         </p:nvSpPr>
         <p:spPr>
           <a:xfrm>
-            <a:off x="5127811" y="-5"/>
-            <a:ext cx="1936377" cy="707886"/>
+            <a:off x="707889" y="-5"/>
+            <a:ext cx="10774564" cy="707886"/>
           </a:xfrm>
           <a:prstGeom prst="rect">
             <a:avLst/>
@@ -3997,6 +4000,16 @@
           <a:lstStyle/>
           <a:p>
             <a:pPr algn="ctr"/>
+            <a:r>
+              <a:rPr lang="nl-BE" sz="4000" b="1" dirty="0" err="1">
+                <a:solidFill>
+                  <a:srgbClr val="4F94F0"/>
+                </a:solidFill>
+                <a:latin typeface="Arial" panose="020B0604020202020204" pitchFamily="34" charset="0"/>
+                <a:cs typeface="Arial" panose="020B0604020202020204" pitchFamily="34" charset="0"/>
+              </a:rPr>
+              <a:t>Implementation</a:t>
+            </a:r>
             <a:r>
               <a:rPr lang="nl-BE" sz="4000" b="1" dirty="0">
                 <a:solidFill>
@@ -4005,8 +4018,25 @@
                 <a:latin typeface="Arial" panose="020B0604020202020204" pitchFamily="34" charset="0"/>
                 <a:cs typeface="Arial" panose="020B0604020202020204" pitchFamily="34" charset="0"/>
               </a:rPr>
-              <a:t>Demo</a:t>
-            </a:r>
+              <a:t> &amp; </a:t>
+            </a:r>
+            <a:r>
+              <a:rPr lang="nl-BE" sz="4000" b="1" dirty="0" err="1">
+                <a:solidFill>
+                  <a:srgbClr val="4F94F0"/>
+                </a:solidFill>
+                <a:latin typeface="Arial" panose="020B0604020202020204" pitchFamily="34" charset="0"/>
+                <a:cs typeface="Arial" panose="020B0604020202020204" pitchFamily="34" charset="0"/>
+              </a:rPr>
+              <a:t>Validation</a:t>
+            </a:r>
+            <a:endParaRPr lang="nl-BE" sz="4000" b="1" dirty="0">
+              <a:solidFill>
+                <a:srgbClr val="4F94F0"/>
+              </a:solidFill>
+              <a:latin typeface="Arial" panose="020B0604020202020204" pitchFamily="34" charset="0"/>
+              <a:cs typeface="Arial" panose="020B0604020202020204" pitchFamily="34" charset="0"/>
+            </a:endParaRPr>
           </a:p>
         </p:txBody>
       </p:sp>
@@ -4046,10 +4076,1632 @@
           </a:prstGeom>
         </p:spPr>
       </p:pic>
+      <p:sp>
+        <p:nvSpPr>
+          <p:cNvPr id="4" name="Tekstvak 3">
+            <a:extLst>
+              <a:ext uri="{FF2B5EF4-FFF2-40B4-BE49-F238E27FC236}">
+                <a16:creationId xmlns:a16="http://schemas.microsoft.com/office/drawing/2014/main" id="{EF489CF1-155E-FE5D-023E-0C9AAEEFC35A}"/>
+              </a:ext>
+            </a:extLst>
+          </p:cNvPr>
+          <p:cNvSpPr txBox="1"/>
+          <p:nvPr/>
+        </p:nvSpPr>
+        <p:spPr>
+          <a:xfrm>
+            <a:off x="1417437" y="1843947"/>
+            <a:ext cx="9357130" cy="3170099"/>
+          </a:xfrm>
+          <a:prstGeom prst="rect">
+            <a:avLst/>
+          </a:prstGeom>
+          <a:noFill/>
+        </p:spPr>
+        <p:txBody>
+          <a:bodyPr wrap="square" rtlCol="0">
+            <a:spAutoFit/>
+          </a:bodyPr>
+          <a:lstStyle/>
+          <a:p>
+            <a:pPr marL="342900" indent="-342900">
+              <a:buFont typeface="Arial" panose="020B0604020202020204" pitchFamily="34" charset="0"/>
+              <a:buChar char="•"/>
+            </a:pPr>
+            <a:r>
+              <a:rPr lang="nl-BE" sz="2000" dirty="0">
+                <a:solidFill>
+                  <a:srgbClr val="4F94F0"/>
+                </a:solidFill>
+                <a:latin typeface="Arial" panose="020B0604020202020204" pitchFamily="34" charset="0"/>
+                <a:cs typeface="Arial" panose="020B0604020202020204" pitchFamily="34" charset="0"/>
+              </a:rPr>
+              <a:t>We </a:t>
+            </a:r>
+            <a:r>
+              <a:rPr lang="nl-BE" sz="2000" dirty="0" err="1">
+                <a:solidFill>
+                  <a:srgbClr val="4F94F0"/>
+                </a:solidFill>
+                <a:latin typeface="Arial" panose="020B0604020202020204" pitchFamily="34" charset="0"/>
+                <a:cs typeface="Arial" panose="020B0604020202020204" pitchFamily="34" charset="0"/>
+              </a:rPr>
+              <a:t>implemented</a:t>
+            </a:r>
+            <a:r>
+              <a:rPr lang="nl-BE" sz="2000" dirty="0">
+                <a:solidFill>
+                  <a:srgbClr val="4F94F0"/>
+                </a:solidFill>
+                <a:latin typeface="Arial" panose="020B0604020202020204" pitchFamily="34" charset="0"/>
+                <a:cs typeface="Arial" panose="020B0604020202020204" pitchFamily="34" charset="0"/>
+              </a:rPr>
+              <a:t> A </a:t>
+            </a:r>
+            <a:r>
+              <a:rPr lang="nl-BE" sz="2000" dirty="0" err="1">
+                <a:solidFill>
+                  <a:srgbClr val="4F94F0"/>
+                </a:solidFill>
+                <a:latin typeface="Arial" panose="020B0604020202020204" pitchFamily="34" charset="0"/>
+                <a:cs typeface="Arial" panose="020B0604020202020204" pitchFamily="34" charset="0"/>
+              </a:rPr>
+              <a:t>sparse</a:t>
+            </a:r>
+            <a:r>
+              <a:rPr lang="nl-BE" sz="2000" dirty="0">
+                <a:solidFill>
+                  <a:srgbClr val="4F94F0"/>
+                </a:solidFill>
+                <a:latin typeface="Arial" panose="020B0604020202020204" pitchFamily="34" charset="0"/>
+                <a:cs typeface="Arial" panose="020B0604020202020204" pitchFamily="34" charset="0"/>
+              </a:rPr>
+              <a:t> matrix.</a:t>
+            </a:r>
+          </a:p>
+          <a:p>
+            <a:endParaRPr lang="nl-BE" sz="2000" dirty="0">
+              <a:solidFill>
+                <a:srgbClr val="4F94F0"/>
+              </a:solidFill>
+              <a:latin typeface="Arial" panose="020B0604020202020204" pitchFamily="34" charset="0"/>
+              <a:cs typeface="Arial" panose="020B0604020202020204" pitchFamily="34" charset="0"/>
+            </a:endParaRPr>
+          </a:p>
+          <a:p>
+            <a:pPr marL="342900" indent="-342900">
+              <a:buFont typeface="Arial" panose="020B0604020202020204" pitchFamily="34" charset="0"/>
+              <a:buChar char="•"/>
+            </a:pPr>
+            <a:r>
+              <a:rPr lang="en-US" sz="2000" dirty="0">
+                <a:solidFill>
+                  <a:srgbClr val="4F94F0"/>
+                </a:solidFill>
+                <a:latin typeface="Arial" panose="020B0604020202020204" pitchFamily="34" charset="0"/>
+                <a:cs typeface="Arial" panose="020B0604020202020204" pitchFamily="34" charset="0"/>
+              </a:rPr>
+              <a:t>We use a simple Map structure (COO format) to store only the non-zero numbers.</a:t>
+            </a:r>
+          </a:p>
+          <a:p>
+            <a:endParaRPr lang="nl-BE" sz="2000" dirty="0">
+              <a:solidFill>
+                <a:srgbClr val="4F94F0"/>
+              </a:solidFill>
+              <a:latin typeface="Arial" panose="020B0604020202020204" pitchFamily="34" charset="0"/>
+              <a:cs typeface="Arial" panose="020B0604020202020204" pitchFamily="34" charset="0"/>
+            </a:endParaRPr>
+          </a:p>
+          <a:p>
+            <a:pPr marL="342900" indent="-342900">
+              <a:buFont typeface="Arial" panose="020B0604020202020204" pitchFamily="34" charset="0"/>
+              <a:buChar char="•"/>
+            </a:pPr>
+            <a:r>
+              <a:rPr lang="en-US" sz="2000" dirty="0">
+                <a:solidFill>
+                  <a:srgbClr val="4F94F0"/>
+                </a:solidFill>
+                <a:latin typeface="Arial" panose="020B0604020202020204" pitchFamily="34" charset="0"/>
+                <a:cs typeface="Arial" panose="020B0604020202020204" pitchFamily="34" charset="0"/>
+              </a:rPr>
+              <a:t>All required unit tests passed, proving the system is correct and saves memory.</a:t>
+            </a:r>
+          </a:p>
+          <a:p>
+            <a:pPr marL="800100" lvl="1" indent="-342900">
+              <a:buFont typeface="Arial" panose="020B0604020202020204" pitchFamily="34" charset="0"/>
+              <a:buChar char="•"/>
+            </a:pPr>
+            <a:r>
+              <a:rPr lang="en-US" sz="2000" dirty="0">
+                <a:solidFill>
+                  <a:srgbClr val="4F94F0"/>
+                </a:solidFill>
+                <a:latin typeface="Arial" panose="020B0604020202020204" pitchFamily="34" charset="0"/>
+                <a:cs typeface="Arial" panose="020B0604020202020204" pitchFamily="34" charset="0"/>
+              </a:rPr>
+              <a:t>Is it more efficient?</a:t>
+            </a:r>
+          </a:p>
+          <a:p>
+            <a:pPr marL="800100" lvl="1" indent="-342900">
+              <a:buFont typeface="Arial" panose="020B0604020202020204" pitchFamily="34" charset="0"/>
+              <a:buChar char="•"/>
+            </a:pPr>
+            <a:r>
+              <a:rPr lang="en-US" sz="2000" dirty="0">
+                <a:solidFill>
+                  <a:srgbClr val="4F94F0"/>
+                </a:solidFill>
+                <a:latin typeface="Arial" panose="020B0604020202020204" pitchFamily="34" charset="0"/>
+                <a:cs typeface="Arial" panose="020B0604020202020204" pitchFamily="34" charset="0"/>
+              </a:rPr>
+              <a:t>Are we actually not storing 0?</a:t>
+            </a:r>
+          </a:p>
+          <a:p>
+            <a:pPr marL="800100" lvl="1" indent="-342900">
+              <a:buFont typeface="Arial" panose="020B0604020202020204" pitchFamily="34" charset="0"/>
+              <a:buChar char="•"/>
+            </a:pPr>
+            <a:r>
+              <a:rPr lang="en-US" sz="2000" dirty="0">
+                <a:solidFill>
+                  <a:srgbClr val="4F94F0"/>
+                </a:solidFill>
+                <a:latin typeface="Arial" panose="020B0604020202020204" pitchFamily="34" charset="0"/>
+                <a:cs typeface="Arial" panose="020B0604020202020204" pitchFamily="34" charset="0"/>
+              </a:rPr>
+              <a:t>Can we copy the matrix and is it exactly the same?</a:t>
+            </a:r>
+          </a:p>
+        </p:txBody>
+      </p:sp>
     </p:spTree>
     <p:extLst>
       <p:ext uri="{BB962C8B-B14F-4D97-AF65-F5344CB8AC3E}">
         <p14:creationId xmlns:p14="http://schemas.microsoft.com/office/powerpoint/2010/main" val="202526251"/>
+      </p:ext>
+    </p:extLst>
+  </p:cSld>
+  <p:clrMapOvr>
+    <a:masterClrMapping/>
+  </p:clrMapOvr>
+  <mc:AlternateContent xmlns:mc="http://schemas.openxmlformats.org/markup-compatibility/2006" xmlns:p159="http://schemas.microsoft.com/office/powerpoint/2015/09/main">
+    <mc:Choice Requires="p159">
+      <p:transition spd="med">
+        <p159:morph option="byObject"/>
+      </p:transition>
+    </mc:Choice>
+    <mc:Fallback xmlns="">
+      <p:transition spd="med">
+        <p:fade/>
+      </p:transition>
+    </mc:Fallback>
+  </mc:AlternateContent>
+</p:sld>
+</file>
+
+<file path=ppt/slides/slide3.xml><?xml version="1.0" encoding="utf-8"?>
+<p:sld xmlns:a="http://schemas.openxmlformats.org/drawingml/2006/main" xmlns:r="http://schemas.openxmlformats.org/officeDocument/2006/relationships" xmlns:p="http://schemas.openxmlformats.org/presentationml/2006/main">
+  <p:cSld>
+    <p:spTree>
+      <p:nvGrpSpPr>
+        <p:cNvPr id="1" name="">
+          <a:extLst>
+            <a:ext uri="{FF2B5EF4-FFF2-40B4-BE49-F238E27FC236}">
+              <a16:creationId xmlns:a16="http://schemas.microsoft.com/office/drawing/2014/main" id="{C61B887A-D35F-230A-439F-96655B8692C5}"/>
+            </a:ext>
+          </a:extLst>
+        </p:cNvPr>
+        <p:cNvGrpSpPr/>
+        <p:nvPr/>
+      </p:nvGrpSpPr>
+      <p:grpSpPr>
+        <a:xfrm>
+          <a:off x="0" y="0"/>
+          <a:ext cx="0" cy="0"/>
+          <a:chOff x="0" y="0"/>
+          <a:chExt cx="0" cy="0"/>
+        </a:xfrm>
+      </p:grpSpPr>
+      <p:pic>
+        <p:nvPicPr>
+          <p:cNvPr id="13" name="Afbeelding 12" descr="Afbeelding met symbool, logo, Graphics, cirkel&#10;&#10;Automatisch gegenereerde beschrijving">
+            <a:extLst>
+              <a:ext uri="{FF2B5EF4-FFF2-40B4-BE49-F238E27FC236}">
+                <a16:creationId xmlns:a16="http://schemas.microsoft.com/office/drawing/2014/main" id="{B17207C4-B536-153E-722A-CBE3C3673472}"/>
+              </a:ext>
+            </a:extLst>
+          </p:cNvPr>
+          <p:cNvPicPr>
+            <a:picLocks noChangeAspect="1"/>
+          </p:cNvPicPr>
+          <p:nvPr/>
+        </p:nvPicPr>
+        <p:blipFill>
+          <a:blip r:embed="rId2">
+            <a:extLst>
+              <a:ext uri="{28A0092B-C50C-407E-A947-70E740481C1C}">
+                <a14:useLocalDpi xmlns:a14="http://schemas.microsoft.com/office/drawing/2010/main" val="0"/>
+              </a:ext>
+            </a:extLst>
+          </a:blip>
+          <a:stretch>
+            <a:fillRect/>
+          </a:stretch>
+        </p:blipFill>
+        <p:spPr>
+          <a:xfrm>
+            <a:off x="3711894" y="1044891"/>
+            <a:ext cx="4768212" cy="4768212"/>
+          </a:xfrm>
+          <a:prstGeom prst="rect">
+            <a:avLst/>
+          </a:prstGeom>
+        </p:spPr>
+      </p:pic>
+      <p:sp>
+        <p:nvSpPr>
+          <p:cNvPr id="6" name="Rechthoek 5">
+            <a:extLst>
+              <a:ext uri="{FF2B5EF4-FFF2-40B4-BE49-F238E27FC236}">
+                <a16:creationId xmlns:a16="http://schemas.microsoft.com/office/drawing/2014/main" id="{11C1C048-DD54-9E0E-C988-70CC1699DD90}"/>
+              </a:ext>
+            </a:extLst>
+          </p:cNvPr>
+          <p:cNvSpPr/>
+          <p:nvPr/>
+        </p:nvSpPr>
+        <p:spPr>
+          <a:xfrm rot="16200000">
+            <a:off x="-3074642" y="3074639"/>
+            <a:ext cx="6858001" cy="708718"/>
+          </a:xfrm>
+          <a:prstGeom prst="rect">
+            <a:avLst/>
+          </a:prstGeom>
+          <a:solidFill>
+            <a:srgbClr val="4F94F0"/>
+          </a:solidFill>
+          <a:ln>
+            <a:solidFill>
+              <a:srgbClr val="4F94F0"/>
+            </a:solidFill>
+          </a:ln>
+        </p:spPr>
+        <p:style>
+          <a:lnRef idx="2">
+            <a:schemeClr val="accent1">
+              <a:shade val="15000"/>
+            </a:schemeClr>
+          </a:lnRef>
+          <a:fillRef idx="1">
+            <a:schemeClr val="accent1"/>
+          </a:fillRef>
+          <a:effectRef idx="0">
+            <a:schemeClr val="accent1"/>
+          </a:effectRef>
+          <a:fontRef idx="minor">
+            <a:schemeClr val="lt1"/>
+          </a:fontRef>
+        </p:style>
+        <p:txBody>
+          <a:bodyPr rtlCol="0" anchor="ctr"/>
+          <a:lstStyle/>
+          <a:p>
+            <a:pPr algn="ctr"/>
+            <a:endParaRPr lang="nl-BE" dirty="0"/>
+          </a:p>
+        </p:txBody>
+      </p:sp>
+      <p:sp>
+        <p:nvSpPr>
+          <p:cNvPr id="16" name="Rechthoek 15">
+            <a:extLst>
+              <a:ext uri="{FF2B5EF4-FFF2-40B4-BE49-F238E27FC236}">
+                <a16:creationId xmlns:a16="http://schemas.microsoft.com/office/drawing/2014/main" id="{A911C48E-1563-CDF5-D8E9-EA7DBDB9006E}"/>
+              </a:ext>
+            </a:extLst>
+          </p:cNvPr>
+          <p:cNvSpPr/>
+          <p:nvPr/>
+        </p:nvSpPr>
+        <p:spPr>
+          <a:xfrm rot="16200000">
+            <a:off x="8408641" y="3074639"/>
+            <a:ext cx="6858001" cy="708717"/>
+          </a:xfrm>
+          <a:prstGeom prst="rect">
+            <a:avLst/>
+          </a:prstGeom>
+          <a:solidFill>
+            <a:srgbClr val="4F94F0"/>
+          </a:solidFill>
+          <a:ln>
+            <a:solidFill>
+              <a:srgbClr val="4F94F0"/>
+            </a:solidFill>
+          </a:ln>
+        </p:spPr>
+        <p:style>
+          <a:lnRef idx="2">
+            <a:schemeClr val="accent1">
+              <a:shade val="15000"/>
+            </a:schemeClr>
+          </a:lnRef>
+          <a:fillRef idx="1">
+            <a:schemeClr val="accent1"/>
+          </a:fillRef>
+          <a:effectRef idx="0">
+            <a:schemeClr val="accent1"/>
+          </a:effectRef>
+          <a:fontRef idx="minor">
+            <a:schemeClr val="lt1"/>
+          </a:fontRef>
+        </p:style>
+        <p:txBody>
+          <a:bodyPr rtlCol="0" anchor="ctr"/>
+          <a:lstStyle/>
+          <a:p>
+            <a:pPr algn="ctr"/>
+            <a:endParaRPr lang="nl-BE" dirty="0"/>
+          </a:p>
+        </p:txBody>
+      </p:sp>
+      <p:sp>
+        <p:nvSpPr>
+          <p:cNvPr id="17" name="Rechthoek 16">
+            <a:extLst>
+              <a:ext uri="{FF2B5EF4-FFF2-40B4-BE49-F238E27FC236}">
+                <a16:creationId xmlns:a16="http://schemas.microsoft.com/office/drawing/2014/main" id="{5BF86FB4-2B83-B337-5357-74F8263FEF80}"/>
+              </a:ext>
+            </a:extLst>
+          </p:cNvPr>
+          <p:cNvSpPr/>
+          <p:nvPr/>
+        </p:nvSpPr>
+        <p:spPr>
+          <a:xfrm rot="16200000">
+            <a:off x="4240307" y="-3531591"/>
+            <a:ext cx="3711388" cy="10774565"/>
+          </a:xfrm>
+          <a:prstGeom prst="rect">
+            <a:avLst/>
+          </a:prstGeom>
+          <a:solidFill>
+            <a:schemeClr val="bg1"/>
+          </a:solidFill>
+          <a:ln>
+            <a:solidFill>
+              <a:schemeClr val="bg1"/>
+            </a:solidFill>
+          </a:ln>
+        </p:spPr>
+        <p:style>
+          <a:lnRef idx="2">
+            <a:schemeClr val="accent1">
+              <a:shade val="15000"/>
+            </a:schemeClr>
+          </a:lnRef>
+          <a:fillRef idx="1">
+            <a:schemeClr val="accent1"/>
+          </a:fillRef>
+          <a:effectRef idx="0">
+            <a:schemeClr val="accent1"/>
+          </a:effectRef>
+          <a:fontRef idx="minor">
+            <a:schemeClr val="lt1"/>
+          </a:fontRef>
+        </p:style>
+        <p:txBody>
+          <a:bodyPr rtlCol="0" anchor="ctr"/>
+          <a:lstStyle/>
+          <a:p>
+            <a:pPr algn="ctr"/>
+            <a:endParaRPr lang="nl-BE" dirty="0"/>
+          </a:p>
+        </p:txBody>
+      </p:sp>
+      <p:sp>
+        <p:nvSpPr>
+          <p:cNvPr id="18" name="Rechthoek 17">
+            <a:extLst>
+              <a:ext uri="{FF2B5EF4-FFF2-40B4-BE49-F238E27FC236}">
+                <a16:creationId xmlns:a16="http://schemas.microsoft.com/office/drawing/2014/main" id="{5D69D29D-2054-F8AC-F383-9FE4FC95931B}"/>
+              </a:ext>
+            </a:extLst>
+          </p:cNvPr>
+          <p:cNvSpPr/>
+          <p:nvPr/>
+        </p:nvSpPr>
+        <p:spPr>
+          <a:xfrm rot="16200000">
+            <a:off x="4522697" y="-102591"/>
+            <a:ext cx="3146610" cy="10774567"/>
+          </a:xfrm>
+          <a:prstGeom prst="rect">
+            <a:avLst/>
+          </a:prstGeom>
+          <a:solidFill>
+            <a:schemeClr val="bg1"/>
+          </a:solidFill>
+          <a:ln>
+            <a:solidFill>
+              <a:schemeClr val="bg1"/>
+            </a:solidFill>
+          </a:ln>
+        </p:spPr>
+        <p:style>
+          <a:lnRef idx="2">
+            <a:schemeClr val="accent1">
+              <a:shade val="15000"/>
+            </a:schemeClr>
+          </a:lnRef>
+          <a:fillRef idx="1">
+            <a:schemeClr val="accent1"/>
+          </a:fillRef>
+          <a:effectRef idx="0">
+            <a:schemeClr val="accent1"/>
+          </a:effectRef>
+          <a:fontRef idx="minor">
+            <a:schemeClr val="lt1"/>
+          </a:fontRef>
+        </p:style>
+        <p:txBody>
+          <a:bodyPr rtlCol="0" anchor="ctr"/>
+          <a:lstStyle/>
+          <a:p>
+            <a:pPr algn="ctr"/>
+            <a:endParaRPr lang="nl-BE" dirty="0"/>
+          </a:p>
+        </p:txBody>
+      </p:sp>
+      <p:sp>
+        <p:nvSpPr>
+          <p:cNvPr id="2" name="Tekstvak 1">
+            <a:extLst>
+              <a:ext uri="{FF2B5EF4-FFF2-40B4-BE49-F238E27FC236}">
+                <a16:creationId xmlns:a16="http://schemas.microsoft.com/office/drawing/2014/main" id="{A4ABAA95-C277-E178-07EA-1EFAED534F80}"/>
+              </a:ext>
+            </a:extLst>
+          </p:cNvPr>
+          <p:cNvSpPr txBox="1"/>
+          <p:nvPr/>
+        </p:nvSpPr>
+        <p:spPr>
+          <a:xfrm>
+            <a:off x="11469838" y="6488668"/>
+            <a:ext cx="771471" cy="369332"/>
+          </a:xfrm>
+          <a:prstGeom prst="rect">
+            <a:avLst/>
+          </a:prstGeom>
+          <a:noFill/>
+        </p:spPr>
+        <p:txBody>
+          <a:bodyPr wrap="square">
+            <a:spAutoFit/>
+          </a:bodyPr>
+          <a:lstStyle/>
+          <a:p>
+            <a:r>
+              <a:rPr lang="nl-BE" sz="1800" b="1" dirty="0">
+                <a:solidFill>
+                  <a:schemeClr val="bg1"/>
+                </a:solidFill>
+                <a:latin typeface="Arial" panose="020B0604020202020204" pitchFamily="34" charset="0"/>
+                <a:cs typeface="Arial" panose="020B0604020202020204" pitchFamily="34" charset="0"/>
+              </a:rPr>
+              <a:t>02/03</a:t>
+            </a:r>
+            <a:endParaRPr lang="nl-BE" dirty="0"/>
+          </a:p>
+        </p:txBody>
+      </p:sp>
+      <p:sp>
+        <p:nvSpPr>
+          <p:cNvPr id="3" name="Tekstvak 2">
+            <a:extLst>
+              <a:ext uri="{FF2B5EF4-FFF2-40B4-BE49-F238E27FC236}">
+                <a16:creationId xmlns:a16="http://schemas.microsoft.com/office/drawing/2014/main" id="{7E5235AD-BDD1-D689-19FB-BBEBF39F22DD}"/>
+              </a:ext>
+            </a:extLst>
+          </p:cNvPr>
+          <p:cNvSpPr txBox="1"/>
+          <p:nvPr/>
+        </p:nvSpPr>
+        <p:spPr>
+          <a:xfrm>
+            <a:off x="707889" y="-5"/>
+            <a:ext cx="10774564" cy="707886"/>
+          </a:xfrm>
+          <a:prstGeom prst="rect">
+            <a:avLst/>
+          </a:prstGeom>
+          <a:noFill/>
+        </p:spPr>
+        <p:txBody>
+          <a:bodyPr wrap="square" rtlCol="0">
+            <a:spAutoFit/>
+          </a:bodyPr>
+          <a:lstStyle/>
+          <a:p>
+            <a:pPr algn="ctr"/>
+            <a:r>
+              <a:rPr lang="nl-BE" sz="4000" b="1" dirty="0" err="1">
+                <a:solidFill>
+                  <a:srgbClr val="4F94F0"/>
+                </a:solidFill>
+                <a:latin typeface="Arial" panose="020B0604020202020204" pitchFamily="34" charset="0"/>
+                <a:cs typeface="Arial" panose="020B0604020202020204" pitchFamily="34" charset="0"/>
+              </a:rPr>
+              <a:t>Limitations</a:t>
+            </a:r>
+            <a:r>
+              <a:rPr lang="nl-BE" sz="4000" b="1" dirty="0">
+                <a:solidFill>
+                  <a:srgbClr val="4F94F0"/>
+                </a:solidFill>
+                <a:latin typeface="Arial" panose="020B0604020202020204" pitchFamily="34" charset="0"/>
+                <a:cs typeface="Arial" panose="020B0604020202020204" pitchFamily="34" charset="0"/>
+              </a:rPr>
+              <a:t> &amp; </a:t>
+            </a:r>
+            <a:r>
+              <a:rPr lang="nl-BE" sz="4000" b="1" dirty="0" err="1">
+                <a:solidFill>
+                  <a:srgbClr val="4F94F0"/>
+                </a:solidFill>
+                <a:latin typeface="Arial" panose="020B0604020202020204" pitchFamily="34" charset="0"/>
+                <a:cs typeface="Arial" panose="020B0604020202020204" pitchFamily="34" charset="0"/>
+              </a:rPr>
+              <a:t>Future</a:t>
+            </a:r>
+            <a:r>
+              <a:rPr lang="nl-BE" sz="4000" b="1" dirty="0">
+                <a:solidFill>
+                  <a:srgbClr val="4F94F0"/>
+                </a:solidFill>
+                <a:latin typeface="Arial" panose="020B0604020202020204" pitchFamily="34" charset="0"/>
+                <a:cs typeface="Arial" panose="020B0604020202020204" pitchFamily="34" charset="0"/>
+              </a:rPr>
+              <a:t> Work</a:t>
+            </a:r>
+          </a:p>
+        </p:txBody>
+      </p:sp>
+      <p:pic>
+        <p:nvPicPr>
+          <p:cNvPr id="5" name="Afbeelding 4" descr="Afbeelding met symbool, logo, Graphics, cirkel&#10;&#10;Automatisch gegenereerde beschrijving">
+            <a:extLst>
+              <a:ext uri="{FF2B5EF4-FFF2-40B4-BE49-F238E27FC236}">
+                <a16:creationId xmlns:a16="http://schemas.microsoft.com/office/drawing/2014/main" id="{18392E34-A764-8093-8130-523C23C9736C}"/>
+              </a:ext>
+            </a:extLst>
+          </p:cNvPr>
+          <p:cNvPicPr>
+            <a:picLocks noChangeAspect="1"/>
+          </p:cNvPicPr>
+          <p:nvPr/>
+        </p:nvPicPr>
+        <p:blipFill>
+          <a:blip r:embed="rId2">
+            <a:extLst>
+              <a:ext uri="{28A0092B-C50C-407E-A947-70E740481C1C}">
+                <a14:useLocalDpi xmlns:a14="http://schemas.microsoft.com/office/drawing/2010/main" val="0"/>
+              </a:ext>
+            </a:extLst>
+          </a:blip>
+          <a:stretch>
+            <a:fillRect/>
+          </a:stretch>
+        </p:blipFill>
+        <p:spPr>
+          <a:xfrm>
+            <a:off x="11484114" y="-4"/>
+            <a:ext cx="707885" cy="707885"/>
+          </a:xfrm>
+          <a:prstGeom prst="rect">
+            <a:avLst/>
+          </a:prstGeom>
+        </p:spPr>
+      </p:pic>
+      <p:sp>
+        <p:nvSpPr>
+          <p:cNvPr id="4" name="Tekstvak 3">
+            <a:extLst>
+              <a:ext uri="{FF2B5EF4-FFF2-40B4-BE49-F238E27FC236}">
+                <a16:creationId xmlns:a16="http://schemas.microsoft.com/office/drawing/2014/main" id="{21DA3BC7-273A-3B36-E8A5-7476034F060A}"/>
+              </a:ext>
+            </a:extLst>
+          </p:cNvPr>
+          <p:cNvSpPr txBox="1"/>
+          <p:nvPr/>
+        </p:nvSpPr>
+        <p:spPr>
+          <a:xfrm>
+            <a:off x="1417437" y="2151724"/>
+            <a:ext cx="9357130" cy="2554545"/>
+          </a:xfrm>
+          <a:prstGeom prst="rect">
+            <a:avLst/>
+          </a:prstGeom>
+          <a:noFill/>
+        </p:spPr>
+        <p:txBody>
+          <a:bodyPr wrap="square" rtlCol="0">
+            <a:spAutoFit/>
+          </a:bodyPr>
+          <a:lstStyle/>
+          <a:p>
+            <a:pPr marL="342900" indent="-342900">
+              <a:buFont typeface="Arial" panose="020B0604020202020204" pitchFamily="34" charset="0"/>
+              <a:buChar char="•"/>
+            </a:pPr>
+            <a:r>
+              <a:rPr lang="en-US" sz="2000" dirty="0">
+                <a:solidFill>
+                  <a:srgbClr val="4F94F0"/>
+                </a:solidFill>
+                <a:latin typeface="Arial" panose="020B0604020202020204" pitchFamily="34" charset="0"/>
+                <a:cs typeface="Arial" panose="020B0604020202020204" pitchFamily="34" charset="0"/>
+              </a:rPr>
+              <a:t>Our current Map structure is easy to use, but there are faster, more complex storage methods available (like CSR).</a:t>
+            </a:r>
+          </a:p>
+          <a:p>
+            <a:pPr marL="800100" lvl="1" indent="-342900">
+              <a:buFont typeface="Arial" panose="020B0604020202020204" pitchFamily="34" charset="0"/>
+              <a:buChar char="•"/>
+            </a:pPr>
+            <a:r>
+              <a:rPr lang="en-US" sz="2000" dirty="0">
+                <a:solidFill>
+                  <a:srgbClr val="4F94F0"/>
+                </a:solidFill>
+                <a:latin typeface="Arial" panose="020B0604020202020204" pitchFamily="34" charset="0"/>
+                <a:cs typeface="Arial" panose="020B0604020202020204" pitchFamily="34" charset="0"/>
+              </a:rPr>
+              <a:t>Compressed Sparse Row: To put it in a nutshell, we are only storing 2 important values instead of the coordinates we store the index end value.</a:t>
+            </a:r>
+          </a:p>
+          <a:p>
+            <a:endParaRPr lang="en-US" sz="2000" dirty="0">
+              <a:solidFill>
+                <a:srgbClr val="4F94F0"/>
+              </a:solidFill>
+              <a:latin typeface="Arial" panose="020B0604020202020204" pitchFamily="34" charset="0"/>
+              <a:cs typeface="Arial" panose="020B0604020202020204" pitchFamily="34" charset="0"/>
+            </a:endParaRPr>
+          </a:p>
+          <a:p>
+            <a:pPr marL="342900" indent="-342900">
+              <a:buFont typeface="Arial" panose="020B0604020202020204" pitchFamily="34" charset="0"/>
+              <a:buChar char="•"/>
+            </a:pPr>
+            <a:r>
+              <a:rPr lang="en-US" sz="2000" dirty="0">
+                <a:solidFill>
+                  <a:srgbClr val="4F94F0"/>
+                </a:solidFill>
+                <a:latin typeface="Arial" panose="020B0604020202020204" pitchFamily="34" charset="0"/>
+                <a:cs typeface="Arial" panose="020B0604020202020204" pitchFamily="34" charset="0"/>
+              </a:rPr>
+              <a:t>Addition (+) and Subtraction (-).</a:t>
+            </a:r>
+          </a:p>
+          <a:p>
+            <a:pPr marL="342900" indent="-342900">
+              <a:buFont typeface="Arial" panose="020B0604020202020204" pitchFamily="34" charset="0"/>
+              <a:buChar char="•"/>
+            </a:pPr>
+            <a:endParaRPr lang="en-US" sz="2000" dirty="0">
+              <a:solidFill>
+                <a:srgbClr val="4F94F0"/>
+              </a:solidFill>
+              <a:latin typeface="Arial" panose="020B0604020202020204" pitchFamily="34" charset="0"/>
+              <a:cs typeface="Arial" panose="020B0604020202020204" pitchFamily="34" charset="0"/>
+            </a:endParaRPr>
+          </a:p>
+          <a:p>
+            <a:pPr marL="342900" indent="-342900">
+              <a:buFont typeface="Arial" panose="020B0604020202020204" pitchFamily="34" charset="0"/>
+              <a:buChar char="•"/>
+            </a:pPr>
+            <a:r>
+              <a:rPr lang="en-US" sz="2000" dirty="0">
+                <a:solidFill>
+                  <a:srgbClr val="4F94F0"/>
+                </a:solidFill>
+                <a:latin typeface="Arial" panose="020B0604020202020204" pitchFamily="34" charset="0"/>
+                <a:cs typeface="Arial" panose="020B0604020202020204" pitchFamily="34" charset="0"/>
+              </a:rPr>
+              <a:t>It may be fun to do it in 3D for example.</a:t>
+            </a:r>
+          </a:p>
+        </p:txBody>
+      </p:sp>
+    </p:spTree>
+    <p:extLst>
+      <p:ext uri="{BB962C8B-B14F-4D97-AF65-F5344CB8AC3E}">
+        <p14:creationId xmlns:p14="http://schemas.microsoft.com/office/powerpoint/2010/main" val="657320245"/>
+      </p:ext>
+    </p:extLst>
+  </p:cSld>
+  <p:clrMapOvr>
+    <a:masterClrMapping/>
+  </p:clrMapOvr>
+  <mc:AlternateContent xmlns:mc="http://schemas.openxmlformats.org/markup-compatibility/2006" xmlns:p159="http://schemas.microsoft.com/office/powerpoint/2015/09/main">
+    <mc:Choice Requires="p159">
+      <p:transition spd="med">
+        <p159:morph option="byObject"/>
+      </p:transition>
+    </mc:Choice>
+    <mc:Fallback xmlns="">
+      <p:transition spd="med">
+        <p:fade/>
+      </p:transition>
+    </mc:Fallback>
+  </mc:AlternateContent>
+</p:sld>
+</file>
+
+<file path=ppt/slides/slide4.xml><?xml version="1.0" encoding="utf-8"?>
+<p:sld xmlns:a="http://schemas.openxmlformats.org/drawingml/2006/main" xmlns:r="http://schemas.openxmlformats.org/officeDocument/2006/relationships" xmlns:p="http://schemas.openxmlformats.org/presentationml/2006/main">
+  <p:cSld>
+    <p:spTree>
+      <p:nvGrpSpPr>
+        <p:cNvPr id="1" name="">
+          <a:extLst>
+            <a:ext uri="{FF2B5EF4-FFF2-40B4-BE49-F238E27FC236}">
+              <a16:creationId xmlns:a16="http://schemas.microsoft.com/office/drawing/2014/main" id="{65DA61C1-B7F2-355D-7C2E-802FA5CFA024}"/>
+            </a:ext>
+          </a:extLst>
+        </p:cNvPr>
+        <p:cNvGrpSpPr/>
+        <p:nvPr/>
+      </p:nvGrpSpPr>
+      <p:grpSpPr>
+        <a:xfrm>
+          <a:off x="0" y="0"/>
+          <a:ext cx="0" cy="0"/>
+          <a:chOff x="0" y="0"/>
+          <a:chExt cx="0" cy="0"/>
+        </a:xfrm>
+      </p:grpSpPr>
+      <p:pic>
+        <p:nvPicPr>
+          <p:cNvPr id="13" name="Afbeelding 12" descr="Afbeelding met symbool, logo, Graphics, cirkel&#10;&#10;Automatisch gegenereerde beschrijving">
+            <a:extLst>
+              <a:ext uri="{FF2B5EF4-FFF2-40B4-BE49-F238E27FC236}">
+                <a16:creationId xmlns:a16="http://schemas.microsoft.com/office/drawing/2014/main" id="{85812A4B-93EA-6B6F-2A14-9890CA4AD76E}"/>
+              </a:ext>
+            </a:extLst>
+          </p:cNvPr>
+          <p:cNvPicPr>
+            <a:picLocks noChangeAspect="1"/>
+          </p:cNvPicPr>
+          <p:nvPr/>
+        </p:nvPicPr>
+        <p:blipFill>
+          <a:blip r:embed="rId2">
+            <a:extLst>
+              <a:ext uri="{28A0092B-C50C-407E-A947-70E740481C1C}">
+                <a14:useLocalDpi xmlns:a14="http://schemas.microsoft.com/office/drawing/2010/main" val="0"/>
+              </a:ext>
+            </a:extLst>
+          </a:blip>
+          <a:stretch>
+            <a:fillRect/>
+          </a:stretch>
+        </p:blipFill>
+        <p:spPr>
+          <a:xfrm>
+            <a:off x="3711894" y="1044891"/>
+            <a:ext cx="4768212" cy="4768212"/>
+          </a:xfrm>
+          <a:prstGeom prst="rect">
+            <a:avLst/>
+          </a:prstGeom>
+        </p:spPr>
+      </p:pic>
+      <p:sp>
+        <p:nvSpPr>
+          <p:cNvPr id="6" name="Rechthoek 5">
+            <a:extLst>
+              <a:ext uri="{FF2B5EF4-FFF2-40B4-BE49-F238E27FC236}">
+                <a16:creationId xmlns:a16="http://schemas.microsoft.com/office/drawing/2014/main" id="{FD658844-07DF-92FE-D951-11390C66E4B5}"/>
+              </a:ext>
+            </a:extLst>
+          </p:cNvPr>
+          <p:cNvSpPr/>
+          <p:nvPr/>
+        </p:nvSpPr>
+        <p:spPr>
+          <a:xfrm rot="16200000">
+            <a:off x="-3074642" y="3074639"/>
+            <a:ext cx="6858001" cy="708718"/>
+          </a:xfrm>
+          <a:prstGeom prst="rect">
+            <a:avLst/>
+          </a:prstGeom>
+          <a:solidFill>
+            <a:srgbClr val="4F94F0"/>
+          </a:solidFill>
+          <a:ln>
+            <a:solidFill>
+              <a:srgbClr val="4F94F0"/>
+            </a:solidFill>
+          </a:ln>
+        </p:spPr>
+        <p:style>
+          <a:lnRef idx="2">
+            <a:schemeClr val="accent1">
+              <a:shade val="15000"/>
+            </a:schemeClr>
+          </a:lnRef>
+          <a:fillRef idx="1">
+            <a:schemeClr val="accent1"/>
+          </a:fillRef>
+          <a:effectRef idx="0">
+            <a:schemeClr val="accent1"/>
+          </a:effectRef>
+          <a:fontRef idx="minor">
+            <a:schemeClr val="lt1"/>
+          </a:fontRef>
+        </p:style>
+        <p:txBody>
+          <a:bodyPr rtlCol="0" anchor="ctr"/>
+          <a:lstStyle/>
+          <a:p>
+            <a:pPr algn="ctr"/>
+            <a:endParaRPr lang="nl-BE" dirty="0"/>
+          </a:p>
+        </p:txBody>
+      </p:sp>
+      <p:sp>
+        <p:nvSpPr>
+          <p:cNvPr id="16" name="Rechthoek 15">
+            <a:extLst>
+              <a:ext uri="{FF2B5EF4-FFF2-40B4-BE49-F238E27FC236}">
+                <a16:creationId xmlns:a16="http://schemas.microsoft.com/office/drawing/2014/main" id="{4DDF89F3-C5D8-701F-84C4-3A7CB77AA380}"/>
+              </a:ext>
+            </a:extLst>
+          </p:cNvPr>
+          <p:cNvSpPr/>
+          <p:nvPr/>
+        </p:nvSpPr>
+        <p:spPr>
+          <a:xfrm rot="16200000">
+            <a:off x="8408641" y="3074639"/>
+            <a:ext cx="6858001" cy="708717"/>
+          </a:xfrm>
+          <a:prstGeom prst="rect">
+            <a:avLst/>
+          </a:prstGeom>
+          <a:solidFill>
+            <a:srgbClr val="4F94F0"/>
+          </a:solidFill>
+          <a:ln>
+            <a:solidFill>
+              <a:srgbClr val="4F94F0"/>
+            </a:solidFill>
+          </a:ln>
+        </p:spPr>
+        <p:style>
+          <a:lnRef idx="2">
+            <a:schemeClr val="accent1">
+              <a:shade val="15000"/>
+            </a:schemeClr>
+          </a:lnRef>
+          <a:fillRef idx="1">
+            <a:schemeClr val="accent1"/>
+          </a:fillRef>
+          <a:effectRef idx="0">
+            <a:schemeClr val="accent1"/>
+          </a:effectRef>
+          <a:fontRef idx="minor">
+            <a:schemeClr val="lt1"/>
+          </a:fontRef>
+        </p:style>
+        <p:txBody>
+          <a:bodyPr rtlCol="0" anchor="ctr"/>
+          <a:lstStyle/>
+          <a:p>
+            <a:pPr algn="ctr"/>
+            <a:endParaRPr lang="nl-BE" dirty="0"/>
+          </a:p>
+        </p:txBody>
+      </p:sp>
+      <p:sp>
+        <p:nvSpPr>
+          <p:cNvPr id="17" name="Rechthoek 16">
+            <a:extLst>
+              <a:ext uri="{FF2B5EF4-FFF2-40B4-BE49-F238E27FC236}">
+                <a16:creationId xmlns:a16="http://schemas.microsoft.com/office/drawing/2014/main" id="{E5F6ED6B-BAB6-C4DC-A1FF-932DEF4B732C}"/>
+              </a:ext>
+            </a:extLst>
+          </p:cNvPr>
+          <p:cNvSpPr/>
+          <p:nvPr/>
+        </p:nvSpPr>
+        <p:spPr>
+          <a:xfrm rot="16200000">
+            <a:off x="4240307" y="-3531591"/>
+            <a:ext cx="3711388" cy="10774565"/>
+          </a:xfrm>
+          <a:prstGeom prst="rect">
+            <a:avLst/>
+          </a:prstGeom>
+          <a:solidFill>
+            <a:schemeClr val="bg1"/>
+          </a:solidFill>
+          <a:ln>
+            <a:solidFill>
+              <a:schemeClr val="bg1"/>
+            </a:solidFill>
+          </a:ln>
+        </p:spPr>
+        <p:style>
+          <a:lnRef idx="2">
+            <a:schemeClr val="accent1">
+              <a:shade val="15000"/>
+            </a:schemeClr>
+          </a:lnRef>
+          <a:fillRef idx="1">
+            <a:schemeClr val="accent1"/>
+          </a:fillRef>
+          <a:effectRef idx="0">
+            <a:schemeClr val="accent1"/>
+          </a:effectRef>
+          <a:fontRef idx="minor">
+            <a:schemeClr val="lt1"/>
+          </a:fontRef>
+        </p:style>
+        <p:txBody>
+          <a:bodyPr rtlCol="0" anchor="ctr"/>
+          <a:lstStyle/>
+          <a:p>
+            <a:pPr algn="ctr"/>
+            <a:endParaRPr lang="nl-BE" dirty="0"/>
+          </a:p>
+        </p:txBody>
+      </p:sp>
+      <p:sp>
+        <p:nvSpPr>
+          <p:cNvPr id="18" name="Rechthoek 17">
+            <a:extLst>
+              <a:ext uri="{FF2B5EF4-FFF2-40B4-BE49-F238E27FC236}">
+                <a16:creationId xmlns:a16="http://schemas.microsoft.com/office/drawing/2014/main" id="{8E3EC065-5C20-17BD-41CC-468F5F5D07B5}"/>
+              </a:ext>
+            </a:extLst>
+          </p:cNvPr>
+          <p:cNvSpPr/>
+          <p:nvPr/>
+        </p:nvSpPr>
+        <p:spPr>
+          <a:xfrm rot="16200000">
+            <a:off x="4522697" y="-102591"/>
+            <a:ext cx="3146610" cy="10774567"/>
+          </a:xfrm>
+          <a:prstGeom prst="rect">
+            <a:avLst/>
+          </a:prstGeom>
+          <a:solidFill>
+            <a:schemeClr val="bg1"/>
+          </a:solidFill>
+          <a:ln>
+            <a:solidFill>
+              <a:schemeClr val="bg1"/>
+            </a:solidFill>
+          </a:ln>
+        </p:spPr>
+        <p:style>
+          <a:lnRef idx="2">
+            <a:schemeClr val="accent1">
+              <a:shade val="15000"/>
+            </a:schemeClr>
+          </a:lnRef>
+          <a:fillRef idx="1">
+            <a:schemeClr val="accent1"/>
+          </a:fillRef>
+          <a:effectRef idx="0">
+            <a:schemeClr val="accent1"/>
+          </a:effectRef>
+          <a:fontRef idx="minor">
+            <a:schemeClr val="lt1"/>
+          </a:fontRef>
+        </p:style>
+        <p:txBody>
+          <a:bodyPr rtlCol="0" anchor="ctr"/>
+          <a:lstStyle/>
+          <a:p>
+            <a:pPr algn="ctr"/>
+            <a:endParaRPr lang="nl-BE" dirty="0"/>
+          </a:p>
+        </p:txBody>
+      </p:sp>
+      <p:sp>
+        <p:nvSpPr>
+          <p:cNvPr id="2" name="Tekstvak 1">
+            <a:extLst>
+              <a:ext uri="{FF2B5EF4-FFF2-40B4-BE49-F238E27FC236}">
+                <a16:creationId xmlns:a16="http://schemas.microsoft.com/office/drawing/2014/main" id="{F2A62671-F134-24A8-47AE-D2F983F697F2}"/>
+              </a:ext>
+            </a:extLst>
+          </p:cNvPr>
+          <p:cNvSpPr txBox="1"/>
+          <p:nvPr/>
+        </p:nvSpPr>
+        <p:spPr>
+          <a:xfrm>
+            <a:off x="11469838" y="6488668"/>
+            <a:ext cx="771471" cy="369332"/>
+          </a:xfrm>
+          <a:prstGeom prst="rect">
+            <a:avLst/>
+          </a:prstGeom>
+          <a:noFill/>
+        </p:spPr>
+        <p:txBody>
+          <a:bodyPr wrap="square">
+            <a:spAutoFit/>
+          </a:bodyPr>
+          <a:lstStyle/>
+          <a:p>
+            <a:r>
+              <a:rPr lang="nl-BE" sz="1800" b="1" dirty="0">
+                <a:solidFill>
+                  <a:schemeClr val="bg1"/>
+                </a:solidFill>
+                <a:latin typeface="Arial" panose="020B0604020202020204" pitchFamily="34" charset="0"/>
+                <a:cs typeface="Arial" panose="020B0604020202020204" pitchFamily="34" charset="0"/>
+              </a:rPr>
+              <a:t>03/03</a:t>
+            </a:r>
+            <a:endParaRPr lang="nl-BE" dirty="0"/>
+          </a:p>
+        </p:txBody>
+      </p:sp>
+      <p:sp>
+        <p:nvSpPr>
+          <p:cNvPr id="3" name="Tekstvak 2">
+            <a:extLst>
+              <a:ext uri="{FF2B5EF4-FFF2-40B4-BE49-F238E27FC236}">
+                <a16:creationId xmlns:a16="http://schemas.microsoft.com/office/drawing/2014/main" id="{0664F20B-371D-8CBA-AB5F-25E9A4A39E67}"/>
+              </a:ext>
+            </a:extLst>
+          </p:cNvPr>
+          <p:cNvSpPr txBox="1"/>
+          <p:nvPr/>
+        </p:nvSpPr>
+        <p:spPr>
+          <a:xfrm>
+            <a:off x="708716" y="-5"/>
+            <a:ext cx="10788013" cy="707886"/>
+          </a:xfrm>
+          <a:prstGeom prst="rect">
+            <a:avLst/>
+          </a:prstGeom>
+          <a:noFill/>
+        </p:spPr>
+        <p:txBody>
+          <a:bodyPr wrap="square" rtlCol="0">
+            <a:spAutoFit/>
+          </a:bodyPr>
+          <a:lstStyle/>
+          <a:p>
+            <a:pPr algn="ctr"/>
+            <a:r>
+              <a:rPr lang="nl-BE" sz="4000" b="1" dirty="0" err="1">
+                <a:solidFill>
+                  <a:srgbClr val="4F94F0"/>
+                </a:solidFill>
+                <a:latin typeface="Arial" panose="020B0604020202020204" pitchFamily="34" charset="0"/>
+                <a:cs typeface="Arial" panose="020B0604020202020204" pitchFamily="34" charset="0"/>
+              </a:rPr>
+              <a:t>Visualization</a:t>
+            </a:r>
+            <a:r>
+              <a:rPr lang="nl-BE" sz="4000" b="1" dirty="0">
+                <a:solidFill>
+                  <a:srgbClr val="4F94F0"/>
+                </a:solidFill>
+                <a:latin typeface="Arial" panose="020B0604020202020204" pitchFamily="34" charset="0"/>
+                <a:cs typeface="Arial" panose="020B0604020202020204" pitchFamily="34" charset="0"/>
+              </a:rPr>
+              <a:t> </a:t>
+            </a:r>
+          </a:p>
+        </p:txBody>
+      </p:sp>
+      <p:pic>
+        <p:nvPicPr>
+          <p:cNvPr id="5" name="Afbeelding 4" descr="Afbeelding met symbool, logo, Graphics, cirkel&#10;&#10;Automatisch gegenereerde beschrijving">
+            <a:extLst>
+              <a:ext uri="{FF2B5EF4-FFF2-40B4-BE49-F238E27FC236}">
+                <a16:creationId xmlns:a16="http://schemas.microsoft.com/office/drawing/2014/main" id="{1E29FD03-9EBA-3A8D-07EB-4E8DD653DADF}"/>
+              </a:ext>
+            </a:extLst>
+          </p:cNvPr>
+          <p:cNvPicPr>
+            <a:picLocks noChangeAspect="1"/>
+          </p:cNvPicPr>
+          <p:nvPr/>
+        </p:nvPicPr>
+        <p:blipFill>
+          <a:blip r:embed="rId2">
+            <a:extLst>
+              <a:ext uri="{28A0092B-C50C-407E-A947-70E740481C1C}">
+                <a14:useLocalDpi xmlns:a14="http://schemas.microsoft.com/office/drawing/2010/main" val="0"/>
+              </a:ext>
+            </a:extLst>
+          </a:blip>
+          <a:stretch>
+            <a:fillRect/>
+          </a:stretch>
+        </p:blipFill>
+        <p:spPr>
+          <a:xfrm>
+            <a:off x="11484114" y="-4"/>
+            <a:ext cx="707885" cy="707885"/>
+          </a:xfrm>
+          <a:prstGeom prst="rect">
+            <a:avLst/>
+          </a:prstGeom>
+        </p:spPr>
+      </p:pic>
+      <p:pic>
+        <p:nvPicPr>
+          <p:cNvPr id="7" name="Afbeelding 6" descr="Afbeelding met tekst, nummer, diagram, schermopname&#10;&#10;Door AI gegenereerde inhoud is mogelijk onjuist.">
+            <a:extLst>
+              <a:ext uri="{FF2B5EF4-FFF2-40B4-BE49-F238E27FC236}">
+                <a16:creationId xmlns:a16="http://schemas.microsoft.com/office/drawing/2014/main" id="{FB8DD79F-D580-6363-2FF8-2674E3A87455}"/>
+              </a:ext>
+            </a:extLst>
+          </p:cNvPr>
+          <p:cNvPicPr>
+            <a:picLocks noChangeAspect="1"/>
+          </p:cNvPicPr>
+          <p:nvPr/>
+        </p:nvPicPr>
+        <p:blipFill>
+          <a:blip r:embed="rId3">
+            <a:extLst>
+              <a:ext uri="{28A0092B-C50C-407E-A947-70E740481C1C}">
+                <a14:useLocalDpi xmlns:a14="http://schemas.microsoft.com/office/drawing/2010/main" val="0"/>
+              </a:ext>
+            </a:extLst>
+          </a:blip>
+          <a:stretch>
+            <a:fillRect/>
+          </a:stretch>
+        </p:blipFill>
+        <p:spPr>
+          <a:xfrm>
+            <a:off x="1061330" y="908301"/>
+            <a:ext cx="10082784" cy="5041392"/>
+          </a:xfrm>
+          <a:prstGeom prst="rect">
+            <a:avLst/>
+          </a:prstGeom>
+        </p:spPr>
+      </p:pic>
+      <p:sp>
+        <p:nvSpPr>
+          <p:cNvPr id="8" name="Rechthoek 7">
+            <a:extLst>
+              <a:ext uri="{FF2B5EF4-FFF2-40B4-BE49-F238E27FC236}">
+                <a16:creationId xmlns:a16="http://schemas.microsoft.com/office/drawing/2014/main" id="{D7E4CC29-276A-C6EA-D5ED-F1A72170BC52}"/>
+              </a:ext>
+            </a:extLst>
+          </p:cNvPr>
+          <p:cNvSpPr/>
+          <p:nvPr/>
+        </p:nvSpPr>
+        <p:spPr>
+          <a:xfrm rot="16200000">
+            <a:off x="6774974" y="-1669576"/>
+            <a:ext cx="582172" cy="5737923"/>
+          </a:xfrm>
+          <a:prstGeom prst="rect">
+            <a:avLst/>
+          </a:prstGeom>
+          <a:solidFill>
+            <a:schemeClr val="bg1"/>
+          </a:solidFill>
+          <a:ln>
+            <a:solidFill>
+              <a:schemeClr val="bg1"/>
+            </a:solidFill>
+          </a:ln>
+        </p:spPr>
+        <p:style>
+          <a:lnRef idx="2">
+            <a:schemeClr val="accent1">
+              <a:shade val="15000"/>
+            </a:schemeClr>
+          </a:lnRef>
+          <a:fillRef idx="1">
+            <a:schemeClr val="accent1"/>
+          </a:fillRef>
+          <a:effectRef idx="0">
+            <a:schemeClr val="accent1"/>
+          </a:effectRef>
+          <a:fontRef idx="minor">
+            <a:schemeClr val="lt1"/>
+          </a:fontRef>
+        </p:style>
+        <p:txBody>
+          <a:bodyPr rtlCol="0" anchor="ctr"/>
+          <a:lstStyle/>
+          <a:p>
+            <a:pPr algn="ctr"/>
+            <a:endParaRPr lang="nl-BE" dirty="0"/>
+          </a:p>
+        </p:txBody>
+      </p:sp>
+      <p:sp>
+        <p:nvSpPr>
+          <p:cNvPr id="9" name="Rechthoek 8">
+            <a:extLst>
+              <a:ext uri="{FF2B5EF4-FFF2-40B4-BE49-F238E27FC236}">
+                <a16:creationId xmlns:a16="http://schemas.microsoft.com/office/drawing/2014/main" id="{7FCDDC89-ACF8-ABD2-F2CD-2E1D63AD594A}"/>
+              </a:ext>
+            </a:extLst>
+          </p:cNvPr>
+          <p:cNvSpPr/>
+          <p:nvPr/>
+        </p:nvSpPr>
+        <p:spPr>
+          <a:xfrm rot="16200000">
+            <a:off x="7609603" y="460977"/>
+            <a:ext cx="582172" cy="2058987"/>
+          </a:xfrm>
+          <a:prstGeom prst="rect">
+            <a:avLst/>
+          </a:prstGeom>
+          <a:solidFill>
+            <a:schemeClr val="bg1"/>
+          </a:solidFill>
+          <a:ln>
+            <a:solidFill>
+              <a:schemeClr val="bg1"/>
+            </a:solidFill>
+          </a:ln>
+        </p:spPr>
+        <p:style>
+          <a:lnRef idx="2">
+            <a:schemeClr val="accent1">
+              <a:shade val="15000"/>
+            </a:schemeClr>
+          </a:lnRef>
+          <a:fillRef idx="1">
+            <a:schemeClr val="accent1"/>
+          </a:fillRef>
+          <a:effectRef idx="0">
+            <a:schemeClr val="accent1"/>
+          </a:effectRef>
+          <a:fontRef idx="minor">
+            <a:schemeClr val="lt1"/>
+          </a:fontRef>
+        </p:style>
+        <p:txBody>
+          <a:bodyPr rtlCol="0" anchor="ctr"/>
+          <a:lstStyle/>
+          <a:p>
+            <a:pPr algn="ctr"/>
+            <a:endParaRPr lang="nl-BE" dirty="0"/>
+          </a:p>
+        </p:txBody>
+      </p:sp>
+    </p:spTree>
+    <p:extLst>
+      <p:ext uri="{BB962C8B-B14F-4D97-AF65-F5344CB8AC3E}">
+        <p14:creationId xmlns:p14="http://schemas.microsoft.com/office/powerpoint/2010/main" val="1820697279"/>
+      </p:ext>
+    </p:extLst>
+  </p:cSld>
+  <p:clrMapOvr>
+    <a:masterClrMapping/>
+  </p:clrMapOvr>
+  <mc:AlternateContent xmlns:mc="http://schemas.openxmlformats.org/markup-compatibility/2006" xmlns:p159="http://schemas.microsoft.com/office/powerpoint/2015/09/main">
+    <mc:Choice Requires="p159">
+      <p:transition spd="med">
+        <p159:morph option="byObject"/>
+      </p:transition>
+    </mc:Choice>
+    <mc:Fallback xmlns="">
+      <p:transition spd="med">
+        <p:fade/>
+      </p:transition>
+    </mc:Fallback>
+  </mc:AlternateContent>
+</p:sld>
+</file>
+
+<file path=ppt/slides/slide5.xml><?xml version="1.0" encoding="utf-8"?>
+<p:sld xmlns:a="http://schemas.openxmlformats.org/drawingml/2006/main" xmlns:r="http://schemas.openxmlformats.org/officeDocument/2006/relationships" xmlns:p="http://schemas.openxmlformats.org/presentationml/2006/main">
+  <p:cSld>
+    <p:spTree>
+      <p:nvGrpSpPr>
+        <p:cNvPr id="1" name="">
+          <a:extLst>
+            <a:ext uri="{FF2B5EF4-FFF2-40B4-BE49-F238E27FC236}">
+              <a16:creationId xmlns:a16="http://schemas.microsoft.com/office/drawing/2014/main" id="{F96F8452-3DE9-7F04-3939-9D82D6DDDF61}"/>
+            </a:ext>
+          </a:extLst>
+        </p:cNvPr>
+        <p:cNvGrpSpPr/>
+        <p:nvPr/>
+      </p:nvGrpSpPr>
+      <p:grpSpPr>
+        <a:xfrm>
+          <a:off x="0" y="0"/>
+          <a:ext cx="0" cy="0"/>
+          <a:chOff x="0" y="0"/>
+          <a:chExt cx="0" cy="0"/>
+        </a:xfrm>
+      </p:grpSpPr>
+      <p:sp>
+        <p:nvSpPr>
+          <p:cNvPr id="6" name="Rechthoek 5">
+            <a:extLst>
+              <a:ext uri="{FF2B5EF4-FFF2-40B4-BE49-F238E27FC236}">
+                <a16:creationId xmlns:a16="http://schemas.microsoft.com/office/drawing/2014/main" id="{200B7EFF-9925-5D91-6E3A-0D88BB05915F}"/>
+              </a:ext>
+            </a:extLst>
+          </p:cNvPr>
+          <p:cNvSpPr/>
+          <p:nvPr/>
+        </p:nvSpPr>
+        <p:spPr>
+          <a:xfrm rot="16200000">
+            <a:off x="-381001" y="380999"/>
+            <a:ext cx="6858001" cy="6096000"/>
+          </a:xfrm>
+          <a:prstGeom prst="rect">
+            <a:avLst/>
+          </a:prstGeom>
+          <a:solidFill>
+            <a:srgbClr val="4F94F0"/>
+          </a:solidFill>
+          <a:ln>
+            <a:solidFill>
+              <a:srgbClr val="4F94F0"/>
+            </a:solidFill>
+          </a:ln>
+        </p:spPr>
+        <p:style>
+          <a:lnRef idx="2">
+            <a:schemeClr val="accent1">
+              <a:shade val="15000"/>
+            </a:schemeClr>
+          </a:lnRef>
+          <a:fillRef idx="1">
+            <a:schemeClr val="accent1"/>
+          </a:fillRef>
+          <a:effectRef idx="0">
+            <a:schemeClr val="accent1"/>
+          </a:effectRef>
+          <a:fontRef idx="minor">
+            <a:schemeClr val="lt1"/>
+          </a:fontRef>
+        </p:style>
+        <p:txBody>
+          <a:bodyPr rtlCol="0" anchor="ctr"/>
+          <a:lstStyle/>
+          <a:p>
+            <a:pPr algn="ctr"/>
+            <a:endParaRPr lang="nl-BE" dirty="0"/>
+          </a:p>
+        </p:txBody>
+      </p:sp>
+      <p:sp>
+        <p:nvSpPr>
+          <p:cNvPr id="16" name="Rechthoek 15">
+            <a:extLst>
+              <a:ext uri="{FF2B5EF4-FFF2-40B4-BE49-F238E27FC236}">
+                <a16:creationId xmlns:a16="http://schemas.microsoft.com/office/drawing/2014/main" id="{0F9AC796-9589-B48F-FCB8-D16AE87D80B2}"/>
+              </a:ext>
+            </a:extLst>
+          </p:cNvPr>
+          <p:cNvSpPr/>
+          <p:nvPr/>
+        </p:nvSpPr>
+        <p:spPr>
+          <a:xfrm rot="16200000">
+            <a:off x="5714999" y="380999"/>
+            <a:ext cx="6858001" cy="6096000"/>
+          </a:xfrm>
+          <a:prstGeom prst="rect">
+            <a:avLst/>
+          </a:prstGeom>
+          <a:solidFill>
+            <a:srgbClr val="4F94F0"/>
+          </a:solidFill>
+          <a:ln>
+            <a:solidFill>
+              <a:srgbClr val="4F94F0"/>
+            </a:solidFill>
+          </a:ln>
+        </p:spPr>
+        <p:style>
+          <a:lnRef idx="2">
+            <a:schemeClr val="accent1">
+              <a:shade val="15000"/>
+            </a:schemeClr>
+          </a:lnRef>
+          <a:fillRef idx="1">
+            <a:schemeClr val="accent1"/>
+          </a:fillRef>
+          <a:effectRef idx="0">
+            <a:schemeClr val="accent1"/>
+          </a:effectRef>
+          <a:fontRef idx="minor">
+            <a:schemeClr val="lt1"/>
+          </a:fontRef>
+        </p:style>
+        <p:txBody>
+          <a:bodyPr rtlCol="0" anchor="ctr"/>
+          <a:lstStyle/>
+          <a:p>
+            <a:pPr algn="ctr"/>
+            <a:endParaRPr lang="nl-BE" dirty="0"/>
+          </a:p>
+        </p:txBody>
+      </p:sp>
+      <p:pic>
+        <p:nvPicPr>
+          <p:cNvPr id="9" name="Afbeelding 8" descr="Afbeelding met symbool, logo, Graphics, cirkel&#10;&#10;Automatisch gegenereerde beschrijving">
+            <a:extLst>
+              <a:ext uri="{FF2B5EF4-FFF2-40B4-BE49-F238E27FC236}">
+                <a16:creationId xmlns:a16="http://schemas.microsoft.com/office/drawing/2014/main" id="{DCBF7A2D-11AB-4CA5-DA24-317D758466D2}"/>
+              </a:ext>
+            </a:extLst>
+          </p:cNvPr>
+          <p:cNvPicPr>
+            <a:picLocks noChangeAspect="1"/>
+          </p:cNvPicPr>
+          <p:nvPr/>
+        </p:nvPicPr>
+        <p:blipFill>
+          <a:blip r:embed="rId2">
+            <a:extLst>
+              <a:ext uri="{28A0092B-C50C-407E-A947-70E740481C1C}">
+                <a14:useLocalDpi xmlns:a14="http://schemas.microsoft.com/office/drawing/2010/main" val="0"/>
+              </a:ext>
+            </a:extLst>
+          </a:blip>
+          <a:stretch>
+            <a:fillRect/>
+          </a:stretch>
+        </p:blipFill>
+        <p:spPr>
+          <a:xfrm>
+            <a:off x="3711892" y="1044893"/>
+            <a:ext cx="4768212" cy="4768212"/>
+          </a:xfrm>
+          <a:prstGeom prst="rect">
+            <a:avLst/>
+          </a:prstGeom>
+        </p:spPr>
+      </p:pic>
+      <p:sp>
+        <p:nvSpPr>
+          <p:cNvPr id="17" name="Rechthoek 16">
+            <a:extLst>
+              <a:ext uri="{FF2B5EF4-FFF2-40B4-BE49-F238E27FC236}">
+                <a16:creationId xmlns:a16="http://schemas.microsoft.com/office/drawing/2014/main" id="{69311509-B175-6E60-6192-DCEA374FBE1A}"/>
+              </a:ext>
+            </a:extLst>
+          </p:cNvPr>
+          <p:cNvSpPr/>
+          <p:nvPr/>
+        </p:nvSpPr>
+        <p:spPr>
+          <a:xfrm rot="16200000">
+            <a:off x="5067302" y="798071"/>
+            <a:ext cx="2057399" cy="461258"/>
+          </a:xfrm>
+          <a:prstGeom prst="rect">
+            <a:avLst/>
+          </a:prstGeom>
+          <a:solidFill>
+            <a:schemeClr val="bg1"/>
+          </a:solidFill>
+          <a:ln>
+            <a:solidFill>
+              <a:schemeClr val="bg1"/>
+            </a:solidFill>
+          </a:ln>
+        </p:spPr>
+        <p:style>
+          <a:lnRef idx="2">
+            <a:schemeClr val="accent1">
+              <a:shade val="15000"/>
+            </a:schemeClr>
+          </a:lnRef>
+          <a:fillRef idx="1">
+            <a:schemeClr val="accent1"/>
+          </a:fillRef>
+          <a:effectRef idx="0">
+            <a:schemeClr val="accent1"/>
+          </a:effectRef>
+          <a:fontRef idx="minor">
+            <a:schemeClr val="lt1"/>
+          </a:fontRef>
+        </p:style>
+        <p:txBody>
+          <a:bodyPr rtlCol="0" anchor="ctr"/>
+          <a:lstStyle/>
+          <a:p>
+            <a:pPr algn="ctr"/>
+            <a:endParaRPr lang="nl-BE" dirty="0"/>
+          </a:p>
+        </p:txBody>
+      </p:sp>
+      <p:sp>
+        <p:nvSpPr>
+          <p:cNvPr id="18" name="Rechthoek 17">
+            <a:extLst>
+              <a:ext uri="{FF2B5EF4-FFF2-40B4-BE49-F238E27FC236}">
+                <a16:creationId xmlns:a16="http://schemas.microsoft.com/office/drawing/2014/main" id="{515834A3-2E47-EE33-ACCD-07965BE2322D}"/>
+              </a:ext>
+            </a:extLst>
+          </p:cNvPr>
+          <p:cNvSpPr/>
+          <p:nvPr/>
+        </p:nvSpPr>
+        <p:spPr>
+          <a:xfrm rot="16200000">
+            <a:off x="5351931" y="5883300"/>
+            <a:ext cx="1488141" cy="461258"/>
+          </a:xfrm>
+          <a:prstGeom prst="rect">
+            <a:avLst/>
+          </a:prstGeom>
+          <a:solidFill>
+            <a:schemeClr val="bg1"/>
+          </a:solidFill>
+          <a:ln>
+            <a:solidFill>
+              <a:schemeClr val="bg1"/>
+            </a:solidFill>
+          </a:ln>
+        </p:spPr>
+        <p:style>
+          <a:lnRef idx="2">
+            <a:schemeClr val="accent1">
+              <a:shade val="15000"/>
+            </a:schemeClr>
+          </a:lnRef>
+          <a:fillRef idx="1">
+            <a:schemeClr val="accent1"/>
+          </a:fillRef>
+          <a:effectRef idx="0">
+            <a:schemeClr val="accent1"/>
+          </a:effectRef>
+          <a:fontRef idx="minor">
+            <a:schemeClr val="lt1"/>
+          </a:fontRef>
+        </p:style>
+        <p:txBody>
+          <a:bodyPr rtlCol="0" anchor="ctr"/>
+          <a:lstStyle/>
+          <a:p>
+            <a:pPr algn="ctr"/>
+            <a:endParaRPr lang="nl-BE" dirty="0"/>
+          </a:p>
+        </p:txBody>
+      </p:sp>
+    </p:spTree>
+    <p:extLst>
+      <p:ext uri="{BB962C8B-B14F-4D97-AF65-F5344CB8AC3E}">
+        <p14:creationId xmlns:p14="http://schemas.microsoft.com/office/powerpoint/2010/main" val="2735581196"/>
       </p:ext>
     </p:extLst>
   </p:cSld>

</xml_diff>